<commit_message>
Updated arch diagram and bullets
</commit_message>
<xml_diff>
--- a/docs/images/cloud-one-conformity-architecture-diagram.pptx
+++ b/docs/images/cloud-one-conformity-architecture-diagram.pptx
@@ -5480,100 +5480,6 @@
           <a:chExt cx="0" cy="0"/>
         </a:xfrm>
       </p:grpSpPr>
-      <p:sp>
-        <p:nvSpPr>
-          <p:cNvPr id="93" name="Google Shape;93;p13"/>
-          <p:cNvSpPr txBox="1"/>
-          <p:nvPr/>
-        </p:nvSpPr>
-        <p:spPr>
-          <a:xfrm>
-            <a:off x="3108960" y="2560320"/>
-            <a:ext cx="1371600" cy="369302"/>
-          </a:xfrm>
-          <a:prstGeom prst="rect">
-            <a:avLst/>
-          </a:prstGeom>
-          <a:noFill/>
-          <a:ln>
-            <a:noFill/>
-          </a:ln>
-        </p:spPr>
-        <p:txBody>
-          <a:bodyPr spcFirstLastPara="1" wrap="square" lIns="91425" tIns="91425" rIns="91425" bIns="91425" anchor="t" anchorCtr="0">
-            <a:spAutoFit/>
-          </a:bodyPr>
-          <a:lstStyle/>
-          <a:p>
-            <a:pPr algn="ctr"/>
-            <a:r>
-              <a:rPr lang="en" sz="1200" dirty="0" smtClean="0">
-                <a:latin typeface="Arial" panose="020B0604020202020204" pitchFamily="34" charset="0"/>
-                <a:cs typeface="Arial" panose="020B0604020202020204" pitchFamily="34" charset="0"/>
-              </a:rPr>
-              <a:t>EventBridge </a:t>
-            </a:r>
-            <a:r>
-              <a:rPr lang="en" sz="1200" dirty="0">
-                <a:latin typeface="Arial" panose="020B0604020202020204" pitchFamily="34" charset="0"/>
-                <a:cs typeface="Arial" panose="020B0604020202020204" pitchFamily="34" charset="0"/>
-              </a:rPr>
-              <a:t>rule</a:t>
-            </a:r>
-            <a:endParaRPr sz="1200" dirty="0">
-              <a:latin typeface="Arial" panose="020B0604020202020204" pitchFamily="34" charset="0"/>
-              <a:cs typeface="Arial" panose="020B0604020202020204" pitchFamily="34" charset="0"/>
-            </a:endParaRPr>
-          </a:p>
-        </p:txBody>
-      </p:sp>
-      <p:cxnSp>
-        <p:nvCxnSpPr>
-          <p:cNvPr id="66" name="Straight Arrow Connector 65">
-            <a:extLst>
-              <a:ext uri="{FF2B5EF4-FFF2-40B4-BE49-F238E27FC236}">
-                <a16:creationId xmlns:a16="http://schemas.microsoft.com/office/drawing/2014/main" id="{9E8BEF15-E8C4-2242-949A-672EF8C74E91}"/>
-              </a:ext>
-            </a:extLst>
-          </p:cNvPr>
-          <p:cNvCxnSpPr>
-            <a:cxnSpLocks/>
-            <a:stCxn id="137" idx="3"/>
-            <a:endCxn id="146" idx="1"/>
-          </p:cNvCxnSpPr>
-          <p:nvPr/>
-        </p:nvCxnSpPr>
-        <p:spPr>
-          <a:xfrm>
-            <a:off x="1018540" y="2331720"/>
-            <a:ext cx="993140" cy="0"/>
-          </a:xfrm>
-          <a:prstGeom prst="straightConnector1">
-            <a:avLst/>
-          </a:prstGeom>
-          <a:ln w="12700">
-            <a:solidFill>
-              <a:srgbClr val="545B64"/>
-            </a:solidFill>
-            <a:headEnd type="none" w="med" len="sm"/>
-            <a:tailEnd type="arrow" w="med" len="sm"/>
-          </a:ln>
-        </p:spPr>
-        <p:style>
-          <a:lnRef idx="1">
-            <a:schemeClr val="accent1"/>
-          </a:lnRef>
-          <a:fillRef idx="0">
-            <a:schemeClr val="accent1"/>
-          </a:fillRef>
-          <a:effectRef idx="0">
-            <a:schemeClr val="accent1"/>
-          </a:effectRef>
-          <a:fontRef idx="minor">
-            <a:schemeClr val="tx1"/>
-          </a:fontRef>
-        </p:style>
-      </p:cxnSp>
       <p:cxnSp>
         <p:nvCxnSpPr>
           <p:cNvPr id="68" name="Straight Arrow Connector 67">
@@ -5592,55 +5498,8 @@
         </p:nvCxnSpPr>
         <p:spPr>
           <a:xfrm>
-            <a:off x="2468880" y="2331720"/>
-            <a:ext cx="1097280" cy="0"/>
-          </a:xfrm>
-          <a:prstGeom prst="straightConnector1">
-            <a:avLst/>
-          </a:prstGeom>
-          <a:ln w="12700">
-            <a:solidFill>
-              <a:srgbClr val="545B64"/>
-            </a:solidFill>
-            <a:headEnd type="none" w="med" len="sm"/>
-            <a:tailEnd type="arrow" w="med" len="sm"/>
-          </a:ln>
-        </p:spPr>
-        <p:style>
-          <a:lnRef idx="1">
-            <a:schemeClr val="accent1"/>
-          </a:lnRef>
-          <a:fillRef idx="0">
-            <a:schemeClr val="accent1"/>
-          </a:fillRef>
-          <a:effectRef idx="0">
-            <a:schemeClr val="accent1"/>
-          </a:effectRef>
-          <a:fontRef idx="minor">
-            <a:schemeClr val="tx1"/>
-          </a:fontRef>
-        </p:style>
-      </p:cxnSp>
-      <p:cxnSp>
-        <p:nvCxnSpPr>
-          <p:cNvPr id="110" name="Straight Arrow Connector 109">
-            <a:extLst>
-              <a:ext uri="{FF2B5EF4-FFF2-40B4-BE49-F238E27FC236}">
-                <a16:creationId xmlns:a16="http://schemas.microsoft.com/office/drawing/2014/main" id="{9E8BEF15-E8C4-2242-949A-672EF8C74E91}"/>
-              </a:ext>
-            </a:extLst>
-          </p:cNvPr>
-          <p:cNvCxnSpPr>
-            <a:cxnSpLocks/>
-            <a:stCxn id="136" idx="3"/>
-            <a:endCxn id="135" idx="1"/>
-          </p:cNvCxnSpPr>
-          <p:nvPr/>
-        </p:nvCxnSpPr>
-        <p:spPr>
-          <a:xfrm>
-            <a:off x="4023360" y="2331720"/>
-            <a:ext cx="1097280" cy="0"/>
+            <a:off x="2314488" y="3765046"/>
+            <a:ext cx="1163206" cy="0"/>
           </a:xfrm>
           <a:prstGeom prst="straightConnector1">
             <a:avLst/>
@@ -5682,8 +5541,8 @@
         </p:nvSpPr>
         <p:spPr>
           <a:xfrm>
-            <a:off x="1280160" y="640080"/>
-            <a:ext cx="6885940" cy="3233420"/>
+            <a:off x="1280160" y="640079"/>
+            <a:ext cx="6731726" cy="4392315"/>
           </a:xfrm>
           <a:prstGeom prst="rect">
             <a:avLst/>
@@ -5793,129 +5652,6 @@
       </p:pic>
       <p:sp>
         <p:nvSpPr>
-          <p:cNvPr id="126" name="Rectangle 125">
-            <a:extLst>
-              <a:ext uri="{FF2B5EF4-FFF2-40B4-BE49-F238E27FC236}">
-                <a16:creationId xmlns:a16="http://schemas.microsoft.com/office/drawing/2014/main" id="{BEFEC4D9-0FF6-0740-BBB7-9A904CD0D43A}"/>
-              </a:ext>
-            </a:extLst>
-          </p:cNvPr>
-          <p:cNvSpPr/>
-          <p:nvPr/>
-        </p:nvSpPr>
-        <p:spPr>
-          <a:xfrm>
-            <a:off x="4300220" y="4277360"/>
-            <a:ext cx="3566160" cy="2011680"/>
-          </a:xfrm>
-          <a:prstGeom prst="rect">
-            <a:avLst/>
-          </a:prstGeom>
-          <a:noFill/>
-          <a:ln w="12700">
-            <a:solidFill>
-              <a:schemeClr val="tx1"/>
-            </a:solidFill>
-          </a:ln>
-        </p:spPr>
-        <p:style>
-          <a:lnRef idx="2">
-            <a:schemeClr val="accent1">
-              <a:shade val="50000"/>
-            </a:schemeClr>
-          </a:lnRef>
-          <a:fillRef idx="1">
-            <a:schemeClr val="accent1"/>
-          </a:fillRef>
-          <a:effectRef idx="0">
-            <a:schemeClr val="accent1"/>
-          </a:effectRef>
-          <a:fontRef idx="minor">
-            <a:schemeClr val="lt1"/>
-          </a:fontRef>
-        </p:style>
-        <p:txBody>
-          <a:bodyPr lIns="457200" tIns="91440"/>
-          <a:lstStyle/>
-          <a:p>
-            <a:pPr>
-              <a:defRPr/>
-            </a:pPr>
-            <a:r>
-              <a:rPr lang="en-US" sz="1400" dirty="0">
-                <a:solidFill>
-                  <a:sysClr val="windowText" lastClr="000000"/>
-                </a:solidFill>
-                <a:latin typeface="Arial" panose="020B0604020202020204" pitchFamily="34" charset="0"/>
-                <a:cs typeface="Arial" panose="020B0604020202020204" pitchFamily="34" charset="0"/>
-              </a:rPr>
-              <a:t>AWS Cloud</a:t>
-            </a:r>
-          </a:p>
-        </p:txBody>
-      </p:sp>
-      <p:pic>
-        <p:nvPicPr>
-          <p:cNvPr id="127" name="Graphic 20">
-            <a:extLst>
-              <a:ext uri="{FF2B5EF4-FFF2-40B4-BE49-F238E27FC236}">
-                <a16:creationId xmlns:a16="http://schemas.microsoft.com/office/drawing/2014/main" id="{3E9996A6-6D01-9B42-8D2D-8C63B84FF81B}"/>
-              </a:ext>
-            </a:extLst>
-          </p:cNvPr>
-          <p:cNvPicPr>
-            <a:picLocks noChangeAspect="1" noChangeArrowheads="1"/>
-          </p:cNvPicPr>
-          <p:nvPr/>
-        </p:nvPicPr>
-        <p:blipFill>
-          <a:blip r:embed="rId3">
-            <a:extLst>
-              <a:ext uri="{28A0092B-C50C-407E-A947-70E740481C1C}">
-                <a14:useLocalDpi xmlns:a14="http://schemas.microsoft.com/office/drawing/2010/main" val="0"/>
-              </a:ext>
-            </a:extLst>
-          </a:blip>
-          <a:srcRect/>
-          <a:stretch>
-            <a:fillRect/>
-          </a:stretch>
-        </p:blipFill>
-        <p:spPr bwMode="auto">
-          <a:xfrm>
-            <a:off x="4300220" y="4277360"/>
-            <a:ext cx="330200" cy="330200"/>
-          </a:xfrm>
-          <a:prstGeom prst="rect">
-            <a:avLst/>
-          </a:prstGeom>
-          <a:noFill/>
-          <a:ln>
-            <a:noFill/>
-          </a:ln>
-          <a:extLst>
-            <a:ext uri="{909E8E84-426E-40DD-AFC4-6F175D3DCCD1}">
-              <a14:hiddenFill xmlns:a14="http://schemas.microsoft.com/office/drawing/2010/main">
-                <a:solidFill>
-                  <a:srgbClr val="FFFFFF"/>
-                </a:solidFill>
-              </a14:hiddenFill>
-            </a:ext>
-            <a:ext uri="{91240B29-F687-4F45-9708-019B960494DF}">
-              <a14:hiddenLine xmlns:a14="http://schemas.microsoft.com/office/drawing/2010/main" w="9525">
-                <a:solidFill>
-                  <a:srgbClr val="000000"/>
-                </a:solidFill>
-                <a:miter lim="800000"/>
-                <a:headEnd/>
-                <a:tailEnd/>
-              </a14:hiddenLine>
-            </a:ext>
-          </a:extLst>
-        </p:spPr>
-      </p:pic>
-      <p:sp>
-        <p:nvSpPr>
           <p:cNvPr id="129" name="Rectangle 128">
             <a:extLst>
               <a:ext uri="{FF2B5EF4-FFF2-40B4-BE49-F238E27FC236}">
@@ -5928,8 +5664,8 @@
         </p:nvSpPr>
         <p:spPr>
           <a:xfrm>
-            <a:off x="1645920" y="1463040"/>
-            <a:ext cx="6152059" cy="2058525"/>
+            <a:off x="1579994" y="1463040"/>
+            <a:ext cx="6152059" cy="3344091"/>
           </a:xfrm>
           <a:prstGeom prst="rect">
             <a:avLst/>
@@ -6066,7 +5802,7 @@
         <p:spPr>
           <a:xfrm>
             <a:off x="1463040" y="1097280"/>
-            <a:ext cx="6550660" cy="2598420"/>
+            <a:ext cx="6399618" cy="3823063"/>
           </a:xfrm>
           <a:prstGeom prst="rect">
             <a:avLst/>
@@ -6128,12 +5864,178 @@
           </a:p>
         </p:txBody>
       </p:sp>
+      <p:sp>
+        <p:nvSpPr>
+          <p:cNvPr id="153" name="TextBox 29">
+            <a:extLst>
+              <a:ext uri="{FF2B5EF4-FFF2-40B4-BE49-F238E27FC236}">
+                <a16:creationId xmlns:a16="http://schemas.microsoft.com/office/drawing/2014/main" id="{A72793CC-CF40-214B-819B-BDB0EF3CE88C}"/>
+              </a:ext>
+            </a:extLst>
+          </p:cNvPr>
+          <p:cNvSpPr txBox="1">
+            <a:spLocks noChangeArrowheads="1"/>
+          </p:cNvSpPr>
+          <p:nvPr/>
+        </p:nvSpPr>
+        <p:spPr bwMode="auto">
+          <a:xfrm>
+            <a:off x="4762013" y="2527354"/>
+            <a:ext cx="914400" cy="461665"/>
+          </a:xfrm>
+          <a:prstGeom prst="rect">
+            <a:avLst/>
+          </a:prstGeom>
+          <a:noFill/>
+          <a:ln>
+            <a:noFill/>
+          </a:ln>
+          <a:extLst>
+            <a:ext uri="{909E8E84-426E-40DD-AFC4-6F175D3DCCD1}">
+              <a14:hiddenFill xmlns:a14="http://schemas.microsoft.com/office/drawing/2010/main">
+                <a:solidFill>
+                  <a:srgbClr val="FFFFFF"/>
+                </a:solidFill>
+              </a14:hiddenFill>
+            </a:ext>
+            <a:ext uri="{91240B29-F687-4F45-9708-019B960494DF}">
+              <a14:hiddenLine xmlns:a14="http://schemas.microsoft.com/office/drawing/2010/main" w="9525">
+                <a:solidFill>
+                  <a:srgbClr val="000000"/>
+                </a:solidFill>
+                <a:miter lim="800000"/>
+                <a:headEnd/>
+                <a:tailEnd/>
+              </a14:hiddenLine>
+            </a:ext>
+          </a:extLst>
+        </p:spPr>
+        <p:txBody>
+          <a:bodyPr>
+            <a:spAutoFit/>
+          </a:bodyPr>
+          <a:lstStyle>
+            <a:lvl1pPr>
+              <a:defRPr>
+                <a:solidFill>
+                  <a:schemeClr val="tx1"/>
+                </a:solidFill>
+                <a:latin typeface="Calibri" panose="020F0502020204030204" pitchFamily="34" charset="0"/>
+              </a:defRPr>
+            </a:lvl1pPr>
+            <a:lvl2pPr marL="742950" indent="-285750">
+              <a:defRPr>
+                <a:solidFill>
+                  <a:schemeClr val="tx1"/>
+                </a:solidFill>
+                <a:latin typeface="Calibri" panose="020F0502020204030204" pitchFamily="34" charset="0"/>
+              </a:defRPr>
+            </a:lvl2pPr>
+            <a:lvl3pPr marL="1143000" indent="-228600">
+              <a:defRPr>
+                <a:solidFill>
+                  <a:schemeClr val="tx1"/>
+                </a:solidFill>
+                <a:latin typeface="Calibri" panose="020F0502020204030204" pitchFamily="34" charset="0"/>
+              </a:defRPr>
+            </a:lvl3pPr>
+            <a:lvl4pPr marL="1600200" indent="-228600">
+              <a:defRPr>
+                <a:solidFill>
+                  <a:schemeClr val="tx1"/>
+                </a:solidFill>
+                <a:latin typeface="Calibri" panose="020F0502020204030204" pitchFamily="34" charset="0"/>
+              </a:defRPr>
+            </a:lvl4pPr>
+            <a:lvl5pPr marL="2057400" indent="-228600">
+              <a:defRPr>
+                <a:solidFill>
+                  <a:schemeClr val="tx1"/>
+                </a:solidFill>
+                <a:latin typeface="Calibri" panose="020F0502020204030204" pitchFamily="34" charset="0"/>
+              </a:defRPr>
+            </a:lvl5pPr>
+            <a:lvl6pPr marL="2514600" indent="-228600" eaLnBrk="0" fontAlgn="base" hangingPunct="0">
+              <a:spcBef>
+                <a:spcPct val="0"/>
+              </a:spcBef>
+              <a:spcAft>
+                <a:spcPct val="0"/>
+              </a:spcAft>
+              <a:defRPr>
+                <a:solidFill>
+                  <a:schemeClr val="tx1"/>
+                </a:solidFill>
+                <a:latin typeface="Calibri" panose="020F0502020204030204" pitchFamily="34" charset="0"/>
+              </a:defRPr>
+            </a:lvl6pPr>
+            <a:lvl7pPr marL="2971800" indent="-228600" eaLnBrk="0" fontAlgn="base" hangingPunct="0">
+              <a:spcBef>
+                <a:spcPct val="0"/>
+              </a:spcBef>
+              <a:spcAft>
+                <a:spcPct val="0"/>
+              </a:spcAft>
+              <a:defRPr>
+                <a:solidFill>
+                  <a:schemeClr val="tx1"/>
+                </a:solidFill>
+                <a:latin typeface="Calibri" panose="020F0502020204030204" pitchFamily="34" charset="0"/>
+              </a:defRPr>
+            </a:lvl7pPr>
+            <a:lvl8pPr marL="3429000" indent="-228600" eaLnBrk="0" fontAlgn="base" hangingPunct="0">
+              <a:spcBef>
+                <a:spcPct val="0"/>
+              </a:spcBef>
+              <a:spcAft>
+                <a:spcPct val="0"/>
+              </a:spcAft>
+              <a:defRPr>
+                <a:solidFill>
+                  <a:schemeClr val="tx1"/>
+                </a:solidFill>
+                <a:latin typeface="Calibri" panose="020F0502020204030204" pitchFamily="34" charset="0"/>
+              </a:defRPr>
+            </a:lvl8pPr>
+            <a:lvl9pPr marL="3886200" indent="-228600" eaLnBrk="0" fontAlgn="base" hangingPunct="0">
+              <a:spcBef>
+                <a:spcPct val="0"/>
+              </a:spcBef>
+              <a:spcAft>
+                <a:spcPct val="0"/>
+              </a:spcAft>
+              <a:defRPr>
+                <a:solidFill>
+                  <a:schemeClr val="tx1"/>
+                </a:solidFill>
+                <a:latin typeface="Calibri" panose="020F0502020204030204" pitchFamily="34" charset="0"/>
+              </a:defRPr>
+            </a:lvl9pPr>
+          </a:lstStyle>
+          <a:p>
+            <a:pPr algn="ctr" eaLnBrk="1" hangingPunct="1"/>
+            <a:r>
+              <a:rPr lang="en-US" altLang="en-US" sz="1200" dirty="0" smtClean="0">
+                <a:latin typeface="Arial" panose="020B0604020202020204" pitchFamily="34" charset="0"/>
+                <a:ea typeface="Amazon Ember" panose="020B0603020204020204" pitchFamily="34" charset="0"/>
+                <a:cs typeface="Arial" panose="020B0604020202020204" pitchFamily="34" charset="0"/>
+              </a:rPr>
+              <a:t>Integration IAM role</a:t>
+            </a:r>
+            <a:endParaRPr lang="en-US" altLang="en-US" sz="1200" dirty="0">
+              <a:latin typeface="Arial" panose="020B0604020202020204" pitchFamily="34" charset="0"/>
+              <a:ea typeface="Amazon Ember" panose="020B0603020204020204" pitchFamily="34" charset="0"/>
+              <a:cs typeface="Arial" panose="020B0604020202020204" pitchFamily="34" charset="0"/>
+            </a:endParaRPr>
+          </a:p>
+        </p:txBody>
+      </p:sp>
       <p:pic>
         <p:nvPicPr>
-          <p:cNvPr id="135" name="Graphic 13">
+          <p:cNvPr id="154" name="Graphic 49">
             <a:extLst>
               <a:ext uri="{FF2B5EF4-FFF2-40B4-BE49-F238E27FC236}">
-                <a16:creationId xmlns:a16="http://schemas.microsoft.com/office/drawing/2014/main" id="{E2B9011C-C7EB-AD4B-85D7-DC979571C750}"/>
+                <a16:creationId xmlns:a16="http://schemas.microsoft.com/office/drawing/2014/main" id="{5A8C48C1-32E1-C747-BB4B-5E3B849CF7A7}"/>
               </a:ext>
             </a:extLst>
           </p:cNvPr>
@@ -6157,7 +6059,285 @@
         </p:blipFill>
         <p:spPr bwMode="auto">
           <a:xfrm>
-            <a:off x="5120640" y="2103120"/>
+            <a:off x="5014615" y="2016086"/>
+            <a:ext cx="457200" cy="457200"/>
+          </a:xfrm>
+          <a:prstGeom prst="rect">
+            <a:avLst/>
+          </a:prstGeom>
+          <a:noFill/>
+          <a:ln>
+            <a:noFill/>
+          </a:ln>
+          <a:extLst>
+            <a:ext uri="{909E8E84-426E-40DD-AFC4-6F175D3DCCD1}">
+              <a14:hiddenFill xmlns:a14="http://schemas.microsoft.com/office/drawing/2010/main">
+                <a:solidFill>
+                  <a:srgbClr val="FFFFFF"/>
+                </a:solidFill>
+              </a14:hiddenFill>
+            </a:ext>
+            <a:ext uri="{91240B29-F687-4F45-9708-019B960494DF}">
+              <a14:hiddenLine xmlns:a14="http://schemas.microsoft.com/office/drawing/2010/main" w="9525">
+                <a:solidFill>
+                  <a:srgbClr val="000000"/>
+                </a:solidFill>
+                <a:miter lim="800000"/>
+                <a:headEnd/>
+                <a:tailEnd/>
+              </a14:hiddenLine>
+            </a:ext>
+          </a:extLst>
+        </p:spPr>
+      </p:pic>
+      <p:sp>
+        <p:nvSpPr>
+          <p:cNvPr id="155" name="Rectangle 154">
+            <a:extLst>
+              <a:ext uri="{FF2B5EF4-FFF2-40B4-BE49-F238E27FC236}">
+                <a16:creationId xmlns:a16="http://schemas.microsoft.com/office/drawing/2014/main" id="{FFA89DF7-D079-0947-8E29-4EEA4975DBBD}"/>
+              </a:ext>
+            </a:extLst>
+          </p:cNvPr>
+          <p:cNvSpPr/>
+          <p:nvPr/>
+        </p:nvSpPr>
+        <p:spPr>
+          <a:xfrm>
+            <a:off x="4054928" y="1620508"/>
+            <a:ext cx="2377803" cy="1400205"/>
+          </a:xfrm>
+          <a:prstGeom prst="rect">
+            <a:avLst/>
+          </a:prstGeom>
+          <a:noFill/>
+          <a:ln w="12700">
+            <a:solidFill>
+              <a:srgbClr val="5A6B86"/>
+            </a:solidFill>
+            <a:prstDash val="dash"/>
+          </a:ln>
+        </p:spPr>
+        <p:style>
+          <a:lnRef idx="2">
+            <a:schemeClr val="accent1">
+              <a:shade val="50000"/>
+            </a:schemeClr>
+          </a:lnRef>
+          <a:fillRef idx="1">
+            <a:schemeClr val="accent1"/>
+          </a:fillRef>
+          <a:effectRef idx="0">
+            <a:schemeClr val="accent1"/>
+          </a:effectRef>
+          <a:fontRef idx="minor">
+            <a:schemeClr val="lt1"/>
+          </a:fontRef>
+        </p:style>
+        <p:txBody>
+          <a:bodyPr tIns="91440"/>
+          <a:lstStyle/>
+          <a:p>
+            <a:pPr algn="ctr" eaLnBrk="1" fontAlgn="auto" hangingPunct="1">
+              <a:spcBef>
+                <a:spcPts val="0"/>
+              </a:spcBef>
+              <a:spcAft>
+                <a:spcPts val="0"/>
+              </a:spcAft>
+              <a:defRPr/>
+            </a:pPr>
+            <a:r>
+              <a:rPr lang="en-US" sz="1400" dirty="0" smtClean="0">
+                <a:solidFill>
+                  <a:srgbClr val="5A6B86"/>
+                </a:solidFill>
+                <a:latin typeface="Arial" panose="020B0604020202020204" pitchFamily="34" charset="0"/>
+                <a:cs typeface="Arial" panose="020B0604020202020204" pitchFamily="34" charset="0"/>
+              </a:rPr>
+              <a:t>New AWS account</a:t>
+            </a:r>
+            <a:endParaRPr lang="en-US" sz="1400" dirty="0">
+              <a:solidFill>
+                <a:srgbClr val="5A6B86"/>
+              </a:solidFill>
+              <a:latin typeface="Arial" panose="020B0604020202020204" pitchFamily="34" charset="0"/>
+              <a:cs typeface="Arial" panose="020B0604020202020204" pitchFamily="34" charset="0"/>
+            </a:endParaRPr>
+          </a:p>
+        </p:txBody>
+      </p:sp>
+      <p:sp>
+        <p:nvSpPr>
+          <p:cNvPr id="93" name="Google Shape;93;p13"/>
+          <p:cNvSpPr txBox="1"/>
+          <p:nvPr/>
+        </p:nvSpPr>
+        <p:spPr>
+          <a:xfrm>
+            <a:off x="3020494" y="3993646"/>
+            <a:ext cx="1371600" cy="369302"/>
+          </a:xfrm>
+          <a:prstGeom prst="rect">
+            <a:avLst/>
+          </a:prstGeom>
+          <a:noFill/>
+          <a:ln>
+            <a:noFill/>
+          </a:ln>
+        </p:spPr>
+        <p:txBody>
+          <a:bodyPr spcFirstLastPara="1" wrap="square" lIns="91425" tIns="91425" rIns="91425" bIns="91425" anchor="t" anchorCtr="0">
+            <a:spAutoFit/>
+          </a:bodyPr>
+          <a:lstStyle/>
+          <a:p>
+            <a:pPr algn="ctr"/>
+            <a:r>
+              <a:rPr lang="en" sz="1200" dirty="0" smtClean="0">
+                <a:latin typeface="Arial" panose="020B0604020202020204" pitchFamily="34" charset="0"/>
+                <a:cs typeface="Arial" panose="020B0604020202020204" pitchFamily="34" charset="0"/>
+              </a:rPr>
+              <a:t>EventBridge </a:t>
+            </a:r>
+            <a:r>
+              <a:rPr lang="en" sz="1200" dirty="0">
+                <a:latin typeface="Arial" panose="020B0604020202020204" pitchFamily="34" charset="0"/>
+                <a:cs typeface="Arial" panose="020B0604020202020204" pitchFamily="34" charset="0"/>
+              </a:rPr>
+              <a:t>rule</a:t>
+            </a:r>
+            <a:endParaRPr sz="1200" dirty="0">
+              <a:latin typeface="Arial" panose="020B0604020202020204" pitchFamily="34" charset="0"/>
+              <a:cs typeface="Arial" panose="020B0604020202020204" pitchFamily="34" charset="0"/>
+            </a:endParaRPr>
+          </a:p>
+        </p:txBody>
+      </p:sp>
+      <p:cxnSp>
+        <p:nvCxnSpPr>
+          <p:cNvPr id="66" name="Straight Arrow Connector 65">
+            <a:extLst>
+              <a:ext uri="{FF2B5EF4-FFF2-40B4-BE49-F238E27FC236}">
+                <a16:creationId xmlns:a16="http://schemas.microsoft.com/office/drawing/2014/main" id="{9E8BEF15-E8C4-2242-949A-672EF8C74E91}"/>
+              </a:ext>
+            </a:extLst>
+          </p:cNvPr>
+          <p:cNvCxnSpPr>
+            <a:cxnSpLocks/>
+            <a:stCxn id="137" idx="3"/>
+            <a:endCxn id="146" idx="1"/>
+          </p:cNvCxnSpPr>
+          <p:nvPr/>
+        </p:nvCxnSpPr>
+        <p:spPr>
+          <a:xfrm>
+            <a:off x="864148" y="3765046"/>
+            <a:ext cx="993140" cy="0"/>
+          </a:xfrm>
+          <a:prstGeom prst="straightConnector1">
+            <a:avLst/>
+          </a:prstGeom>
+          <a:ln w="12700">
+            <a:solidFill>
+              <a:srgbClr val="545B64"/>
+            </a:solidFill>
+            <a:headEnd type="none" w="med" len="sm"/>
+            <a:tailEnd type="arrow" w="med" len="sm"/>
+          </a:ln>
+        </p:spPr>
+        <p:style>
+          <a:lnRef idx="1">
+            <a:schemeClr val="accent1"/>
+          </a:lnRef>
+          <a:fillRef idx="0">
+            <a:schemeClr val="accent1"/>
+          </a:fillRef>
+          <a:effectRef idx="0">
+            <a:schemeClr val="accent1"/>
+          </a:effectRef>
+          <a:fontRef idx="minor">
+            <a:schemeClr val="tx1"/>
+          </a:fontRef>
+        </p:style>
+      </p:cxnSp>
+      <p:cxnSp>
+        <p:nvCxnSpPr>
+          <p:cNvPr id="110" name="Straight Arrow Connector 109">
+            <a:extLst>
+              <a:ext uri="{FF2B5EF4-FFF2-40B4-BE49-F238E27FC236}">
+                <a16:creationId xmlns:a16="http://schemas.microsoft.com/office/drawing/2014/main" id="{9E8BEF15-E8C4-2242-949A-672EF8C74E91}"/>
+              </a:ext>
+            </a:extLst>
+          </p:cNvPr>
+          <p:cNvCxnSpPr>
+            <a:cxnSpLocks/>
+            <a:stCxn id="136" idx="3"/>
+            <a:endCxn id="135" idx="1"/>
+          </p:cNvCxnSpPr>
+          <p:nvPr/>
+        </p:nvCxnSpPr>
+        <p:spPr>
+          <a:xfrm>
+            <a:off x="3934894" y="3765046"/>
+            <a:ext cx="1097280" cy="0"/>
+          </a:xfrm>
+          <a:prstGeom prst="straightConnector1">
+            <a:avLst/>
+          </a:prstGeom>
+          <a:ln w="12700">
+            <a:solidFill>
+              <a:srgbClr val="545B64"/>
+            </a:solidFill>
+            <a:headEnd type="none" w="med" len="sm"/>
+            <a:tailEnd type="arrow" w="med" len="sm"/>
+          </a:ln>
+        </p:spPr>
+        <p:style>
+          <a:lnRef idx="1">
+            <a:schemeClr val="accent1"/>
+          </a:lnRef>
+          <a:fillRef idx="0">
+            <a:schemeClr val="accent1"/>
+          </a:fillRef>
+          <a:effectRef idx="0">
+            <a:schemeClr val="accent1"/>
+          </a:effectRef>
+          <a:fontRef idx="minor">
+            <a:schemeClr val="tx1"/>
+          </a:fontRef>
+        </p:style>
+      </p:cxnSp>
+      <p:pic>
+        <p:nvPicPr>
+          <p:cNvPr id="135" name="Graphic 13">
+            <a:extLst>
+              <a:ext uri="{FF2B5EF4-FFF2-40B4-BE49-F238E27FC236}">
+                <a16:creationId xmlns:a16="http://schemas.microsoft.com/office/drawing/2014/main" id="{E2B9011C-C7EB-AD4B-85D7-DC979571C750}"/>
+              </a:ext>
+            </a:extLst>
+          </p:cNvPr>
+          <p:cNvPicPr>
+            <a:picLocks noChangeAspect="1" noChangeArrowheads="1"/>
+          </p:cNvPicPr>
+          <p:nvPr/>
+        </p:nvPicPr>
+        <p:blipFill>
+          <a:blip r:embed="rId6">
+            <a:extLst>
+              <a:ext uri="{28A0092B-C50C-407E-A947-70E740481C1C}">
+                <a14:useLocalDpi xmlns:a14="http://schemas.microsoft.com/office/drawing/2010/main" val="0"/>
+              </a:ext>
+            </a:extLst>
+          </a:blip>
+          <a:srcRect/>
+          <a:stretch>
+            <a:fillRect/>
+          </a:stretch>
+        </p:blipFill>
+        <p:spPr bwMode="auto">
+          <a:xfrm>
+            <a:off x="5032174" y="3536446"/>
             <a:ext cx="457200" cy="457200"/>
           </a:xfrm>
           <a:prstGeom prst="rect">
@@ -6203,7 +6383,7 @@
           <p:nvPr/>
         </p:nvPicPr>
         <p:blipFill>
-          <a:blip r:embed="rId6">
+          <a:blip r:embed="rId7">
             <a:extLst>
               <a:ext uri="{28A0092B-C50C-407E-A947-70E740481C1C}">
                 <a14:useLocalDpi xmlns:a14="http://schemas.microsoft.com/office/drawing/2010/main" val="0"/>
@@ -6217,7 +6397,7 @@
         </p:blipFill>
         <p:spPr bwMode="auto">
           <a:xfrm>
-            <a:off x="3566160" y="2103120"/>
+            <a:off x="3477694" y="3536446"/>
             <a:ext cx="457200" cy="457200"/>
           </a:xfrm>
           <a:prstGeom prst="rect">
@@ -6263,10 +6443,10 @@
           <p:nvPr/>
         </p:nvPicPr>
         <p:blipFill>
-          <a:blip r:embed="rId7">
+          <a:blip r:embed="rId8">
             <a:extLst>
               <a:ext uri="{96DAC541-7B7A-43D3-8B79-37D633B846F1}">
-                <asvg:svgBlip xmlns:asvg="http://schemas.microsoft.com/office/drawing/2016/SVG/main" xmlns="" r:embed="rId20"/>
+                <asvg:svgBlip xmlns="" xmlns:asvg="http://schemas.microsoft.com/office/drawing/2016/SVG/main" r:embed="rId20"/>
               </a:ext>
             </a:extLst>
           </a:blip>
@@ -6275,7 +6455,7 @@
         </p:blipFill>
         <p:spPr bwMode="auto">
           <a:xfrm>
-            <a:off x="548640" y="2096770"/>
+            <a:off x="394248" y="3530096"/>
             <a:ext cx="469900" cy="469900"/>
           </a:xfrm>
           <a:prstGeom prst="rect">
@@ -6322,7 +6502,7 @@
         </p:nvSpPr>
         <p:spPr bwMode="auto">
           <a:xfrm>
-            <a:off x="236220" y="2560320"/>
+            <a:off x="147754" y="3993646"/>
             <a:ext cx="1097280" cy="461665"/>
           </a:xfrm>
           <a:prstGeom prst="rect">
@@ -6492,7 +6672,7 @@
         </p:nvSpPr>
         <p:spPr bwMode="auto">
           <a:xfrm>
-            <a:off x="1711846" y="2611235"/>
+            <a:off x="1557454" y="4044561"/>
             <a:ext cx="1005840" cy="646331"/>
           </a:xfrm>
           <a:prstGeom prst="rect">
@@ -6660,7 +6840,7 @@
           <a:blip r:embed="rId21">
             <a:extLst>
               <a:ext uri="{96DAC541-7B7A-43D3-8B79-37D633B846F1}">
-                <asvg:svgBlip xmlns:asvg="http://schemas.microsoft.com/office/drawing/2016/SVG/main" xmlns="" r:embed="rId24"/>
+                <asvg:svgBlip xmlns="" xmlns:asvg="http://schemas.microsoft.com/office/drawing/2016/SVG/main" r:embed="rId24"/>
               </a:ext>
             </a:extLst>
           </a:blip>
@@ -6669,7 +6849,7 @@
         </p:blipFill>
         <p:spPr bwMode="auto">
           <a:xfrm>
-            <a:off x="2011680" y="2103120"/>
+            <a:off x="1857288" y="3536446"/>
             <a:ext cx="457200" cy="457200"/>
           </a:xfrm>
           <a:prstGeom prst="rect">
@@ -6716,7 +6896,7 @@
         </p:nvSpPr>
         <p:spPr bwMode="auto">
           <a:xfrm>
-            <a:off x="6338190" y="2609965"/>
+            <a:off x="6344886" y="4043291"/>
             <a:ext cx="1345310" cy="461665"/>
           </a:xfrm>
           <a:prstGeom prst="rect">
@@ -6895,7 +7075,7 @@
         </p:blipFill>
         <p:spPr bwMode="auto">
           <a:xfrm>
-            <a:off x="6858000" y="2111629"/>
+            <a:off x="6848743" y="3645301"/>
             <a:ext cx="457200" cy="457200"/>
           </a:xfrm>
           <a:prstGeom prst="rect">
@@ -6926,309 +7106,6 @@
           </a:extLst>
         </p:spPr>
       </p:pic>
-      <p:sp>
-        <p:nvSpPr>
-          <p:cNvPr id="153" name="TextBox 29">
-            <a:extLst>
-              <a:ext uri="{FF2B5EF4-FFF2-40B4-BE49-F238E27FC236}">
-                <a16:creationId xmlns:a16="http://schemas.microsoft.com/office/drawing/2014/main" id="{A72793CC-CF40-214B-819B-BDB0EF3CE88C}"/>
-              </a:ext>
-            </a:extLst>
-          </p:cNvPr>
-          <p:cNvSpPr txBox="1">
-            <a:spLocks noChangeArrowheads="1"/>
-          </p:cNvSpPr>
-          <p:nvPr/>
-        </p:nvSpPr>
-        <p:spPr bwMode="auto">
-          <a:xfrm>
-            <a:off x="4693744" y="5602635"/>
-            <a:ext cx="914400" cy="461665"/>
-          </a:xfrm>
-          <a:prstGeom prst="rect">
-            <a:avLst/>
-          </a:prstGeom>
-          <a:noFill/>
-          <a:ln>
-            <a:noFill/>
-          </a:ln>
-          <a:extLst>
-            <a:ext uri="{909E8E84-426E-40DD-AFC4-6F175D3DCCD1}">
-              <a14:hiddenFill xmlns:a14="http://schemas.microsoft.com/office/drawing/2010/main">
-                <a:solidFill>
-                  <a:srgbClr val="FFFFFF"/>
-                </a:solidFill>
-              </a14:hiddenFill>
-            </a:ext>
-            <a:ext uri="{91240B29-F687-4F45-9708-019B960494DF}">
-              <a14:hiddenLine xmlns:a14="http://schemas.microsoft.com/office/drawing/2010/main" w="9525">
-                <a:solidFill>
-                  <a:srgbClr val="000000"/>
-                </a:solidFill>
-                <a:miter lim="800000"/>
-                <a:headEnd/>
-                <a:tailEnd/>
-              </a14:hiddenLine>
-            </a:ext>
-          </a:extLst>
-        </p:spPr>
-        <p:txBody>
-          <a:bodyPr>
-            <a:spAutoFit/>
-          </a:bodyPr>
-          <a:lstStyle>
-            <a:lvl1pPr>
-              <a:defRPr>
-                <a:solidFill>
-                  <a:schemeClr val="tx1"/>
-                </a:solidFill>
-                <a:latin typeface="Calibri" panose="020F0502020204030204" pitchFamily="34" charset="0"/>
-              </a:defRPr>
-            </a:lvl1pPr>
-            <a:lvl2pPr marL="742950" indent="-285750">
-              <a:defRPr>
-                <a:solidFill>
-                  <a:schemeClr val="tx1"/>
-                </a:solidFill>
-                <a:latin typeface="Calibri" panose="020F0502020204030204" pitchFamily="34" charset="0"/>
-              </a:defRPr>
-            </a:lvl2pPr>
-            <a:lvl3pPr marL="1143000" indent="-228600">
-              <a:defRPr>
-                <a:solidFill>
-                  <a:schemeClr val="tx1"/>
-                </a:solidFill>
-                <a:latin typeface="Calibri" panose="020F0502020204030204" pitchFamily="34" charset="0"/>
-              </a:defRPr>
-            </a:lvl3pPr>
-            <a:lvl4pPr marL="1600200" indent="-228600">
-              <a:defRPr>
-                <a:solidFill>
-                  <a:schemeClr val="tx1"/>
-                </a:solidFill>
-                <a:latin typeface="Calibri" panose="020F0502020204030204" pitchFamily="34" charset="0"/>
-              </a:defRPr>
-            </a:lvl4pPr>
-            <a:lvl5pPr marL="2057400" indent="-228600">
-              <a:defRPr>
-                <a:solidFill>
-                  <a:schemeClr val="tx1"/>
-                </a:solidFill>
-                <a:latin typeface="Calibri" panose="020F0502020204030204" pitchFamily="34" charset="0"/>
-              </a:defRPr>
-            </a:lvl5pPr>
-            <a:lvl6pPr marL="2514600" indent="-228600" eaLnBrk="0" fontAlgn="base" hangingPunct="0">
-              <a:spcBef>
-                <a:spcPct val="0"/>
-              </a:spcBef>
-              <a:spcAft>
-                <a:spcPct val="0"/>
-              </a:spcAft>
-              <a:defRPr>
-                <a:solidFill>
-                  <a:schemeClr val="tx1"/>
-                </a:solidFill>
-                <a:latin typeface="Calibri" panose="020F0502020204030204" pitchFamily="34" charset="0"/>
-              </a:defRPr>
-            </a:lvl6pPr>
-            <a:lvl7pPr marL="2971800" indent="-228600" eaLnBrk="0" fontAlgn="base" hangingPunct="0">
-              <a:spcBef>
-                <a:spcPct val="0"/>
-              </a:spcBef>
-              <a:spcAft>
-                <a:spcPct val="0"/>
-              </a:spcAft>
-              <a:defRPr>
-                <a:solidFill>
-                  <a:schemeClr val="tx1"/>
-                </a:solidFill>
-                <a:latin typeface="Calibri" panose="020F0502020204030204" pitchFamily="34" charset="0"/>
-              </a:defRPr>
-            </a:lvl7pPr>
-            <a:lvl8pPr marL="3429000" indent="-228600" eaLnBrk="0" fontAlgn="base" hangingPunct="0">
-              <a:spcBef>
-                <a:spcPct val="0"/>
-              </a:spcBef>
-              <a:spcAft>
-                <a:spcPct val="0"/>
-              </a:spcAft>
-              <a:defRPr>
-                <a:solidFill>
-                  <a:schemeClr val="tx1"/>
-                </a:solidFill>
-                <a:latin typeface="Calibri" panose="020F0502020204030204" pitchFamily="34" charset="0"/>
-              </a:defRPr>
-            </a:lvl8pPr>
-            <a:lvl9pPr marL="3886200" indent="-228600" eaLnBrk="0" fontAlgn="base" hangingPunct="0">
-              <a:spcBef>
-                <a:spcPct val="0"/>
-              </a:spcBef>
-              <a:spcAft>
-                <a:spcPct val="0"/>
-              </a:spcAft>
-              <a:defRPr>
-                <a:solidFill>
-                  <a:schemeClr val="tx1"/>
-                </a:solidFill>
-                <a:latin typeface="Calibri" panose="020F0502020204030204" pitchFamily="34" charset="0"/>
-              </a:defRPr>
-            </a:lvl9pPr>
-          </a:lstStyle>
-          <a:p>
-            <a:pPr algn="ctr" eaLnBrk="1" hangingPunct="1"/>
-            <a:r>
-              <a:rPr lang="en-US" altLang="en-US" sz="1200" dirty="0" smtClean="0">
-                <a:latin typeface="Arial" panose="020B0604020202020204" pitchFamily="34" charset="0"/>
-                <a:ea typeface="Amazon Ember" panose="020B0603020204020204" pitchFamily="34" charset="0"/>
-                <a:cs typeface="Arial" panose="020B0604020202020204" pitchFamily="34" charset="0"/>
-              </a:rPr>
-              <a:t>Integration IAM role</a:t>
-            </a:r>
-            <a:endParaRPr lang="en-US" altLang="en-US" sz="1200" dirty="0">
-              <a:latin typeface="Arial" panose="020B0604020202020204" pitchFamily="34" charset="0"/>
-              <a:ea typeface="Amazon Ember" panose="020B0603020204020204" pitchFamily="34" charset="0"/>
-              <a:cs typeface="Arial" panose="020B0604020202020204" pitchFamily="34" charset="0"/>
-            </a:endParaRPr>
-          </a:p>
-        </p:txBody>
-      </p:sp>
-      <p:pic>
-        <p:nvPicPr>
-          <p:cNvPr id="154" name="Graphic 49">
-            <a:extLst>
-              <a:ext uri="{FF2B5EF4-FFF2-40B4-BE49-F238E27FC236}">
-                <a16:creationId xmlns:a16="http://schemas.microsoft.com/office/drawing/2014/main" id="{5A8C48C1-32E1-C747-BB4B-5E3B849CF7A7}"/>
-              </a:ext>
-            </a:extLst>
-          </p:cNvPr>
-          <p:cNvPicPr>
-            <a:picLocks noChangeAspect="1" noChangeArrowheads="1"/>
-          </p:cNvPicPr>
-          <p:nvPr/>
-        </p:nvPicPr>
-        <p:blipFill>
-          <a:blip r:embed="rId26">
-            <a:extLst>
-              <a:ext uri="{28A0092B-C50C-407E-A947-70E740481C1C}">
-                <a14:useLocalDpi xmlns:a14="http://schemas.microsoft.com/office/drawing/2010/main" val="0"/>
-              </a:ext>
-            </a:extLst>
-          </a:blip>
-          <a:srcRect/>
-          <a:stretch>
-            <a:fillRect/>
-          </a:stretch>
-        </p:blipFill>
-        <p:spPr bwMode="auto">
-          <a:xfrm>
-            <a:off x="4899232" y="5139879"/>
-            <a:ext cx="457200" cy="457200"/>
-          </a:xfrm>
-          <a:prstGeom prst="rect">
-            <a:avLst/>
-          </a:prstGeom>
-          <a:noFill/>
-          <a:ln>
-            <a:noFill/>
-          </a:ln>
-          <a:extLst>
-            <a:ext uri="{909E8E84-426E-40DD-AFC4-6F175D3DCCD1}">
-              <a14:hiddenFill xmlns:a14="http://schemas.microsoft.com/office/drawing/2010/main">
-                <a:solidFill>
-                  <a:srgbClr val="FFFFFF"/>
-                </a:solidFill>
-              </a14:hiddenFill>
-            </a:ext>
-            <a:ext uri="{91240B29-F687-4F45-9708-019B960494DF}">
-              <a14:hiddenLine xmlns:a14="http://schemas.microsoft.com/office/drawing/2010/main" w="9525">
-                <a:solidFill>
-                  <a:srgbClr val="000000"/>
-                </a:solidFill>
-                <a:miter lim="800000"/>
-                <a:headEnd/>
-                <a:tailEnd/>
-              </a14:hiddenLine>
-            </a:ext>
-          </a:extLst>
-        </p:spPr>
-      </p:pic>
-      <p:sp>
-        <p:nvSpPr>
-          <p:cNvPr id="155" name="Rectangle 154">
-            <a:extLst>
-              <a:ext uri="{FF2B5EF4-FFF2-40B4-BE49-F238E27FC236}">
-                <a16:creationId xmlns:a16="http://schemas.microsoft.com/office/drawing/2014/main" id="{FFA89DF7-D079-0947-8E29-4EEA4975DBBD}"/>
-              </a:ext>
-            </a:extLst>
-          </p:cNvPr>
-          <p:cNvSpPr/>
-          <p:nvPr/>
-        </p:nvSpPr>
-        <p:spPr>
-          <a:xfrm>
-            <a:off x="4483100" y="4771073"/>
-            <a:ext cx="3200400" cy="1280160"/>
-          </a:xfrm>
-          <a:prstGeom prst="rect">
-            <a:avLst/>
-          </a:prstGeom>
-          <a:noFill/>
-          <a:ln w="12700">
-            <a:solidFill>
-              <a:srgbClr val="5A6B86"/>
-            </a:solidFill>
-            <a:prstDash val="dash"/>
-          </a:ln>
-        </p:spPr>
-        <p:style>
-          <a:lnRef idx="2">
-            <a:schemeClr val="accent1">
-              <a:shade val="50000"/>
-            </a:schemeClr>
-          </a:lnRef>
-          <a:fillRef idx="1">
-            <a:schemeClr val="accent1"/>
-          </a:fillRef>
-          <a:effectRef idx="0">
-            <a:schemeClr val="accent1"/>
-          </a:effectRef>
-          <a:fontRef idx="minor">
-            <a:schemeClr val="lt1"/>
-          </a:fontRef>
-        </p:style>
-        <p:txBody>
-          <a:bodyPr tIns="91440"/>
-          <a:lstStyle/>
-          <a:p>
-            <a:pPr algn="ctr" eaLnBrk="1" fontAlgn="auto" hangingPunct="1">
-              <a:spcBef>
-                <a:spcPts val="0"/>
-              </a:spcBef>
-              <a:spcAft>
-                <a:spcPts val="0"/>
-              </a:spcAft>
-              <a:defRPr/>
-            </a:pPr>
-            <a:r>
-              <a:rPr lang="en-US" sz="1400" smtClean="0">
-                <a:solidFill>
-                  <a:srgbClr val="5A6B86"/>
-                </a:solidFill>
-                <a:latin typeface="Arial" panose="020B0604020202020204" pitchFamily="34" charset="0"/>
-                <a:cs typeface="Arial" panose="020B0604020202020204" pitchFamily="34" charset="0"/>
-              </a:rPr>
-              <a:t>New AWS account</a:t>
-            </a:r>
-            <a:endParaRPr lang="en-US" sz="1400" dirty="0">
-              <a:solidFill>
-                <a:srgbClr val="5A6B86"/>
-              </a:solidFill>
-              <a:latin typeface="Arial" panose="020B0604020202020204" pitchFamily="34" charset="0"/>
-              <a:cs typeface="Arial" panose="020B0604020202020204" pitchFamily="34" charset="0"/>
-            </a:endParaRPr>
-          </a:p>
-        </p:txBody>
-      </p:sp>
       <p:sp>
         <p:nvSpPr>
           <p:cNvPr id="158" name="TextBox 17">
@@ -7245,7 +7122,7 @@
         </p:nvSpPr>
         <p:spPr bwMode="auto">
           <a:xfrm>
-            <a:off x="4670632" y="2609965"/>
+            <a:off x="4582166" y="4043291"/>
             <a:ext cx="1371600" cy="276999"/>
           </a:xfrm>
           <a:prstGeom prst="rect">
@@ -7385,15 +7262,7 @@
                 <a:ea typeface="Amazon Ember" panose="020B0603020204020204" pitchFamily="34" charset="0"/>
                 <a:cs typeface="Arial" panose="020B0604020202020204" pitchFamily="34" charset="0"/>
               </a:rPr>
-              <a:t>Lifecycle </a:t>
-            </a:r>
-            <a:r>
-              <a:rPr lang="en-US" altLang="en-US" sz="1200" dirty="0" smtClean="0">
-                <a:latin typeface="Arial" panose="020B0604020202020204" pitchFamily="34" charset="0"/>
-                <a:ea typeface="Amazon Ember" panose="020B0603020204020204" pitchFamily="34" charset="0"/>
-                <a:cs typeface="Arial" panose="020B0604020202020204" pitchFamily="34" charset="0"/>
-              </a:rPr>
-              <a:t>function</a:t>
+              <a:t>Lifecycle function</a:t>
             </a:r>
             <a:endParaRPr lang="en-US" altLang="en-US" sz="1200" dirty="0">
               <a:latin typeface="Arial" panose="020B0604020202020204" pitchFamily="34" charset="0"/>
@@ -7419,7 +7288,7 @@
         </p:nvSpPr>
         <p:spPr bwMode="auto">
           <a:xfrm>
-            <a:off x="2468880" y="1862920"/>
+            <a:off x="2380414" y="3296246"/>
             <a:ext cx="1097280" cy="461665"/>
           </a:xfrm>
           <a:prstGeom prst="rect">
@@ -7559,15 +7428,7 @@
                 <a:ea typeface="Amazon Ember" panose="020B0603020204020204" pitchFamily="34" charset="0"/>
                 <a:cs typeface="Arial" panose="020B0604020202020204" pitchFamily="34" charset="0"/>
               </a:rPr>
-              <a:t>Lifecycle </a:t>
-            </a:r>
-            <a:r>
-              <a:rPr lang="en-US" altLang="en-US" sz="1200" dirty="0" smtClean="0">
-                <a:latin typeface="Arial" panose="020B0604020202020204" pitchFamily="34" charset="0"/>
-                <a:ea typeface="Amazon Ember" panose="020B0603020204020204" pitchFamily="34" charset="0"/>
-                <a:cs typeface="Arial" panose="020B0604020202020204" pitchFamily="34" charset="0"/>
-              </a:rPr>
-              <a:t>event</a:t>
+              <a:t>Lifecycle event</a:t>
             </a:r>
             <a:endParaRPr lang="en-US" altLang="en-US" sz="1200" dirty="0">
               <a:latin typeface="Arial" panose="020B0604020202020204" pitchFamily="34" charset="0"/>
@@ -7577,52 +7438,6 @@
           </a:p>
         </p:txBody>
       </p:sp>
-      <p:cxnSp>
-        <p:nvCxnSpPr>
-          <p:cNvPr id="160" name="Straight Arrow Connector 159">
-            <a:extLst>
-              <a:ext uri="{FF2B5EF4-FFF2-40B4-BE49-F238E27FC236}">
-                <a16:creationId xmlns:a16="http://schemas.microsoft.com/office/drawing/2014/main" id="{9E8BEF15-E8C4-2242-949A-672EF8C74E91}"/>
-              </a:ext>
-            </a:extLst>
-          </p:cNvPr>
-          <p:cNvCxnSpPr>
-            <a:cxnSpLocks/>
-            <a:stCxn id="135" idx="3"/>
-          </p:cNvCxnSpPr>
-          <p:nvPr/>
-        </p:nvCxnSpPr>
-        <p:spPr>
-          <a:xfrm>
-            <a:off x="5577840" y="2331720"/>
-            <a:ext cx="1280160" cy="0"/>
-          </a:xfrm>
-          <a:prstGeom prst="straightConnector1">
-            <a:avLst/>
-          </a:prstGeom>
-          <a:ln w="12700">
-            <a:solidFill>
-              <a:srgbClr val="545B64"/>
-            </a:solidFill>
-            <a:headEnd type="none" w="med" len="sm"/>
-            <a:tailEnd type="arrow" w="med" len="sm"/>
-          </a:ln>
-        </p:spPr>
-        <p:style>
-          <a:lnRef idx="1">
-            <a:schemeClr val="accent1"/>
-          </a:lnRef>
-          <a:fillRef idx="0">
-            <a:schemeClr val="accent1"/>
-          </a:fillRef>
-          <a:effectRef idx="0">
-            <a:schemeClr val="accent1"/>
-          </a:effectRef>
-          <a:fontRef idx="minor">
-            <a:schemeClr val="tx1"/>
-          </a:fontRef>
-        </p:style>
-      </p:cxnSp>
       <p:sp>
         <p:nvSpPr>
           <p:cNvPr id="54" name="TextBox 16">
@@ -7639,7 +7454,7 @@
         </p:nvSpPr>
         <p:spPr bwMode="auto">
           <a:xfrm>
-            <a:off x="6329252" y="5602635"/>
+            <a:off x="6393931" y="2527353"/>
             <a:ext cx="1468727" cy="461665"/>
           </a:xfrm>
           <a:prstGeom prst="rect">
@@ -7823,10 +7638,10 @@
           <p:nvPr/>
         </p:nvPicPr>
         <p:blipFill>
-          <a:blip r:embed="rId27">
+          <a:blip r:embed="rId26">
             <a:extLst>
               <a:ext uri="{96DAC541-7B7A-43D3-8B79-37D633B846F1}">
-                <asvg:svgBlip xmlns:asvg="http://schemas.microsoft.com/office/drawing/2016/SVG/main" xmlns="" r:embed="rId28"/>
+                <asvg:svgBlip xmlns="" xmlns:asvg="http://schemas.microsoft.com/office/drawing/2016/SVG/main" r:embed="rId28"/>
               </a:ext>
             </a:extLst>
           </a:blip>
@@ -7835,7 +7650,7 @@
         </p:blipFill>
         <p:spPr bwMode="auto">
           <a:xfrm>
-            <a:off x="6824628" y="5145435"/>
+            <a:off x="6861159" y="2031989"/>
             <a:ext cx="457200" cy="457200"/>
           </a:xfrm>
           <a:prstGeom prst="rect">
@@ -7868,29 +7683,121 @@
       </p:pic>
       <p:cxnSp>
         <p:nvCxnSpPr>
-          <p:cNvPr id="56" name="Straight Arrow Connector 55">
+          <p:cNvPr id="34" name="Straight Arrow Connector 33">
             <a:extLst>
               <a:ext uri="{FF2B5EF4-FFF2-40B4-BE49-F238E27FC236}">
-                <a16:creationId xmlns:a16="http://schemas.microsoft.com/office/drawing/2014/main" id="{8D03254C-121F-FA45-9F5F-8EF6057F3650}"/>
+                <a16:creationId xmlns:a16="http://schemas.microsoft.com/office/drawing/2014/main" id="{9E8BEF15-E8C4-2242-949A-672EF8C74E91}"/>
               </a:ext>
             </a:extLst>
           </p:cNvPr>
-          <p:cNvCxnSpPr/>
+          <p:cNvCxnSpPr>
+            <a:cxnSpLocks/>
+          </p:cNvCxnSpPr>
           <p:nvPr/>
         </p:nvCxnSpPr>
         <p:spPr>
-          <a:xfrm rot="16200000">
-            <a:off x="4774572" y="3615075"/>
-            <a:ext cx="1188720" cy="0"/>
+          <a:xfrm flipH="1" flipV="1">
+            <a:off x="5247037" y="2944150"/>
+            <a:ext cx="4887" cy="548640"/>
           </a:xfrm>
           <a:prstGeom prst="straightConnector1">
             <a:avLst/>
           </a:prstGeom>
           <a:ln w="12700">
             <a:solidFill>
-              <a:schemeClr val="tx1"/>
+              <a:srgbClr val="545B64"/>
             </a:solidFill>
-            <a:headEnd type="arrow" w="med" len="sm"/>
+            <a:headEnd type="none" w="med" len="sm"/>
+            <a:tailEnd type="arrow" w="med" len="sm"/>
+          </a:ln>
+        </p:spPr>
+        <p:style>
+          <a:lnRef idx="1">
+            <a:schemeClr val="accent1"/>
+          </a:lnRef>
+          <a:fillRef idx="0">
+            <a:schemeClr val="accent1"/>
+          </a:fillRef>
+          <a:effectRef idx="0">
+            <a:schemeClr val="accent1"/>
+          </a:effectRef>
+          <a:fontRef idx="minor">
+            <a:schemeClr val="tx1"/>
+          </a:fontRef>
+        </p:style>
+      </p:cxnSp>
+      <p:cxnSp>
+        <p:nvCxnSpPr>
+          <p:cNvPr id="37" name="Straight Arrow Connector 36">
+            <a:extLst>
+              <a:ext uri="{FF2B5EF4-FFF2-40B4-BE49-F238E27FC236}">
+                <a16:creationId xmlns:a16="http://schemas.microsoft.com/office/drawing/2014/main" id="{9E8BEF15-E8C4-2242-949A-672EF8C74E91}"/>
+              </a:ext>
+            </a:extLst>
+          </p:cNvPr>
+          <p:cNvCxnSpPr>
+            <a:cxnSpLocks/>
+          </p:cNvCxnSpPr>
+          <p:nvPr/>
+        </p:nvCxnSpPr>
+        <p:spPr>
+          <a:xfrm>
+            <a:off x="5495183" y="2260589"/>
+            <a:ext cx="1371600" cy="0"/>
+          </a:xfrm>
+          <a:prstGeom prst="straightConnector1">
+            <a:avLst/>
+          </a:prstGeom>
+          <a:ln w="12700">
+            <a:solidFill>
+              <a:srgbClr val="545B64"/>
+            </a:solidFill>
+            <a:headEnd type="none" w="med" len="sm"/>
+            <a:tailEnd type="arrow" w="med" len="sm"/>
+          </a:ln>
+        </p:spPr>
+        <p:style>
+          <a:lnRef idx="1">
+            <a:schemeClr val="accent1"/>
+          </a:lnRef>
+          <a:fillRef idx="0">
+            <a:schemeClr val="accent1"/>
+          </a:fillRef>
+          <a:effectRef idx="0">
+            <a:schemeClr val="accent1"/>
+          </a:effectRef>
+          <a:fontRef idx="minor">
+            <a:schemeClr val="tx1"/>
+          </a:fontRef>
+        </p:style>
+      </p:cxnSp>
+      <p:cxnSp>
+        <p:nvCxnSpPr>
+          <p:cNvPr id="38" name="Straight Arrow Connector 37">
+            <a:extLst>
+              <a:ext uri="{FF2B5EF4-FFF2-40B4-BE49-F238E27FC236}">
+                <a16:creationId xmlns:a16="http://schemas.microsoft.com/office/drawing/2014/main" id="{9E8BEF15-E8C4-2242-949A-672EF8C74E91}"/>
+              </a:ext>
+            </a:extLst>
+          </p:cNvPr>
+          <p:cNvCxnSpPr>
+            <a:cxnSpLocks/>
+          </p:cNvCxnSpPr>
+          <p:nvPr/>
+        </p:nvCxnSpPr>
+        <p:spPr>
+          <a:xfrm flipH="1">
+            <a:off x="7072811" y="2977076"/>
+            <a:ext cx="1" cy="731520"/>
+          </a:xfrm>
+          <a:prstGeom prst="straightConnector1">
+            <a:avLst/>
+          </a:prstGeom>
+          <a:ln w="12700">
+            <a:solidFill>
+              <a:srgbClr val="545B64"/>
+            </a:solidFill>
+            <a:headEnd type="none" w="med" len="sm"/>
             <a:tailEnd type="arrow" w="med" len="sm"/>
           </a:ln>
         </p:spPr>

</xml_diff>